<commit_message>
Added Github repo url
</commit_message>
<xml_diff>
--- a/doc/Astropy-and-Friends.pptx
+++ b/doc/Astropy-and-Friends.pptx
@@ -218,7 +218,7 @@
           <a:p>
             <a:fld id="{F98456CD-C349-48CA-A8E4-556409A2B3C5}" type="datetimeFigureOut">
               <a:rPr lang="de-DE" smtClean="0"/>
-              <a:t>12.02.2025</a:t>
+              <a:t>24.02.2025</a:t>
             </a:fld>
             <a:endParaRPr lang="de-DE"/>
           </a:p>
@@ -2450,7 +2450,9 @@
         </p:nvSpPr>
         <p:spPr/>
         <p:txBody>
-          <a:bodyPr/>
+          <a:bodyPr>
+            <a:noAutofit/>
+          </a:bodyPr>
           <a:lstStyle/>
           <a:p>
             <a:r>
@@ -2462,6 +2464,21 @@
             <a:r>
               <a:rPr lang="de-DE" dirty="0"/>
               <a:t>Dr. Martin Junius</a:t>
+            </a:r>
+          </a:p>
+          <a:p>
+            <a:endParaRPr lang="de-DE" dirty="0"/>
+          </a:p>
+          <a:p>
+            <a:r>
+              <a:rPr lang="de-DE" dirty="0">
+                <a:hlinkClick r:id="rId2"/>
+              </a:rPr>
+              <a:t>https://github.com/phtnnz/astropy-workbench</a:t>
+            </a:r>
+            <a:r>
+              <a:rPr lang="de-DE" dirty="0"/>
+              <a:t> </a:t>
             </a:r>
           </a:p>
         </p:txBody>

</xml_diff>